<commit_message>
perbaikan data di halaman 18
</commit_message>
<xml_diff>
--- a/TUGAS BESAR BIG DATA ISEP-FARHAN-TAUFIQ-DARA.pptx
+++ b/TUGAS BESAR BIG DATA ISEP-FARHAN-TAUFIQ-DARA.pptx
@@ -15104,7 +15104,22 @@
           <a:p>
             <a:r>
               <a:rPr lang="sv-SE" sz="2400" dirty="0"/>
-              <a:t>Perbandingan korban berdasarkan jenis kelamin menggunakan pie chart</a:t>
+              <a:t>Perbandingan korban berdasarkan jenis kelamin </a:t>
+            </a:r>
+            <a:r>
+              <a:rPr lang="sv-SE" sz="2400"/>
+              <a:t>menggunakan </a:t>
+            </a:r>
+            <a:br>
+              <a:rPr lang="sv-SE" sz="2400"/>
+            </a:br>
+            <a:r>
+              <a:rPr lang="sv-SE" sz="2400"/>
+              <a:t>pie </a:t>
+            </a:r>
+            <a:r>
+              <a:rPr lang="sv-SE" sz="2400" dirty="0"/>
+              <a:t>chart</a:t>
             </a:r>
             <a:endParaRPr lang="en-US" sz="2400" dirty="0"/>
           </a:p>
@@ -15255,10 +15270,10 @@
       </p:sp>
       <p:pic>
         <p:nvPicPr>
-          <p:cNvPr id="8" name="Picture 7" descr="A picture containing graphical user interface&#10;&#10;Description automatically generated">
-            <a:extLst>
-              <a:ext uri="{FF2B5EF4-FFF2-40B4-BE49-F238E27FC236}">
-                <a16:creationId xmlns:a16="http://schemas.microsoft.com/office/drawing/2014/main" id="{86716600-510B-2292-B87F-70B0B91E1AA1}"/>
+          <p:cNvPr id="6" name="Picture 5" descr="Text&#10;&#10;Description automatically generated">
+            <a:extLst>
+              <a:ext uri="{FF2B5EF4-FFF2-40B4-BE49-F238E27FC236}">
+                <a16:creationId xmlns:a16="http://schemas.microsoft.com/office/drawing/2014/main" id="{BAABF15E-DAA7-05F4-E00A-C9315A753729}"/>
               </a:ext>
             </a:extLst>
           </p:cNvPr>
@@ -15275,8 +15290,8 @@
         </p:blipFill>
         <p:spPr>
           <a:xfrm>
-            <a:off x="1238250" y="2393950"/>
-            <a:ext cx="3880184" cy="914400"/>
+            <a:off x="1238789" y="2633510"/>
+            <a:ext cx="2571750" cy="1266825"/>
           </a:xfrm>
           <a:prstGeom prst="rect">
             <a:avLst/>
@@ -15285,10 +15300,10 @@
       </p:pic>
       <p:pic>
         <p:nvPicPr>
-          <p:cNvPr id="5" name="Picture 4" descr="Chart&#10;&#10;Description automatically generated">
-            <a:extLst>
-              <a:ext uri="{FF2B5EF4-FFF2-40B4-BE49-F238E27FC236}">
-                <a16:creationId xmlns:a16="http://schemas.microsoft.com/office/drawing/2014/main" id="{9E443944-F4B8-76F5-FC62-3ACEC088FB24}"/>
+          <p:cNvPr id="7" name="Picture 6" descr="Chart&#10;&#10;Description automatically generated">
+            <a:extLst>
+              <a:ext uri="{FF2B5EF4-FFF2-40B4-BE49-F238E27FC236}">
+                <a16:creationId xmlns:a16="http://schemas.microsoft.com/office/drawing/2014/main" id="{1C665B61-A1F8-06AC-0E14-EB1243AEC308}"/>
               </a:ext>
             </a:extLst>
           </p:cNvPr>
@@ -20917,6 +20932,15 @@
 </file>
 
 <file path=customXml/item1.xml><?xml version="1.0" encoding="utf-8"?>
+<?mso-contentType ?>
+<FormTemplates xmlns="http://schemas.microsoft.com/sharepoint/v3/contenttype/forms">
+  <Display>DocumentLibraryForm</Display>
+  <Edit>DocumentLibraryForm</Edit>
+  <New>DocumentLibraryForm</New>
+</FormTemplates>
+</file>
+
+<file path=customXml/item2.xml><?xml version="1.0" encoding="utf-8"?>
 <ct:contentTypeSchema xmlns:ct="http://schemas.microsoft.com/office/2006/metadata/contentType" xmlns:ma="http://schemas.microsoft.com/office/2006/metadata/properties/metaAttributes" ct:_="" ma:_="" ma:contentTypeName="Document" ma:contentTypeID="0x01010079F111ED35F8CC479449609E8A0923A6" ma:contentTypeVersion="21" ma:contentTypeDescription="Create a new document." ma:contentTypeScope="" ma:versionID="64dfb1555687e0874b4304b796b5b0c7">
   <xsd:schema xmlns:xsd="http://www.w3.org/2001/XMLSchema" xmlns:xs="http://www.w3.org/2001/XMLSchema" xmlns:p="http://schemas.microsoft.com/office/2006/metadata/properties" xmlns:ns1="http://schemas.microsoft.com/sharepoint/v3" xmlns:ns2="71af3243-3dd4-4a8d-8c0d-dd76da1f02a5" xmlns:ns3="16c05727-aa75-4e4a-9b5f-8a80a1165891" xmlns:ns4="230e9df3-be65-4c73-a93b-d1236ebd677e" targetNamespace="http://schemas.microsoft.com/office/2006/metadata/properties" ma:root="true" ma:fieldsID="e6e4c555b5e194d05b7203de9c4567b3" ns1:_="" ns2:_="" ns3:_="" ns4:_="">
     <xsd:import namespace="http://schemas.microsoft.com/sharepoint/v3"/>
@@ -21198,15 +21222,6 @@
 </ct:contentTypeSchema>
 </file>
 
-<file path=customXml/item2.xml><?xml version="1.0" encoding="utf-8"?>
-<?mso-contentType ?>
-<FormTemplates xmlns="http://schemas.microsoft.com/sharepoint/v3/contenttype/forms">
-  <Display>DocumentLibraryForm</Display>
-  <Edit>DocumentLibraryForm</Edit>
-  <New>DocumentLibraryForm</New>
-</FormTemplates>
-</file>
-
 <file path=customXml/item3.xml><?xml version="1.0" encoding="utf-8"?>
 <p:properties xmlns:p="http://schemas.microsoft.com/office/2006/metadata/properties" xmlns:xsi="http://www.w3.org/2001/XMLSchema-instance" xmlns:pc="http://schemas.microsoft.com/office/infopath/2007/PartnerControls">
   <documentManagement>
@@ -21227,6 +21242,14 @@
 </file>
 
 <file path=customXml/itemProps1.xml><?xml version="1.0" encoding="utf-8"?>
+<ds:datastoreItem xmlns:ds="http://schemas.openxmlformats.org/officeDocument/2006/customXml" ds:itemID="{85334180-0405-413B-834A-44FA9E05ADB7}">
+  <ds:schemaRefs>
+    <ds:schemaRef ds:uri="http://schemas.microsoft.com/sharepoint/v3/contenttype/forms"/>
+  </ds:schemaRefs>
+</ds:datastoreItem>
+</file>
+
+<file path=customXml/itemProps2.xml><?xml version="1.0" encoding="utf-8"?>
 <ds:datastoreItem xmlns:ds="http://schemas.openxmlformats.org/officeDocument/2006/customXml" ds:itemID="{4A615295-94F6-4CE2-A1B1-6B7E1DAA5AD6}">
   <ds:schemaRefs>
     <ds:schemaRef ds:uri="http://schemas.microsoft.com/office/2006/metadata/contentType"/>
@@ -21243,14 +21266,6 @@
     <ds:schemaRef ds:uri="http://purl.org/dc/elements/1.1/"/>
     <ds:schemaRef ds:uri="http://purl.org/dc/terms/"/>
     <ds:schemaRef ds:uri="http://schemas.microsoft.com/internal/obd"/>
-  </ds:schemaRefs>
-</ds:datastoreItem>
-</file>
-
-<file path=customXml/itemProps2.xml><?xml version="1.0" encoding="utf-8"?>
-<ds:datastoreItem xmlns:ds="http://schemas.openxmlformats.org/officeDocument/2006/customXml" ds:itemID="{85334180-0405-413B-834A-44FA9E05ADB7}">
-  <ds:schemaRefs>
-    <ds:schemaRef ds:uri="http://schemas.microsoft.com/sharepoint/v3/contenttype/forms"/>
   </ds:schemaRefs>
 </ds:datastoreItem>
 </file>

</xml_diff>